<commit_message>
CUDA, slides and examples
</commit_message>
<xml_diff>
--- a/week08/Lecture08-cuda.pptx
+++ b/week08/Lecture08-cuda.pptx
@@ -206,7 +206,7 @@
           <a:p>
             <a:fld id="{634F3F22-B4BB-3F48-9180-464A9F2D66D1}" type="datetimeFigureOut">
               <a:rPr kumimoji="1" lang="zh-CN" altLang="en-US" smtClean="0"/>
-              <a:t>2024/5/17</a:t>
+              <a:t>2024/5/18</a:t>
             </a:fld>
             <a:endParaRPr kumimoji="1" lang="zh-CN" altLang="en-US"/>
           </a:p>
@@ -686,7 +686,7 @@
           <a:p>
             <a:fld id="{FC19A4FA-3D9A-4114-B0D5-759CBD56F1AB}" type="datetimeFigureOut">
               <a:rPr lang="zh-CN" altLang="en-US" smtClean="0"/>
-              <a:t>2024/5/17</a:t>
+              <a:t>2024/5/18</a:t>
             </a:fld>
             <a:endParaRPr lang="zh-CN" altLang="en-US"/>
           </a:p>
@@ -889,7 +889,7 @@
           <a:p>
             <a:fld id="{FC19A4FA-3D9A-4114-B0D5-759CBD56F1AB}" type="datetimeFigureOut">
               <a:rPr lang="zh-CN" altLang="en-US" smtClean="0"/>
-              <a:t>2024/5/17</a:t>
+              <a:t>2024/5/18</a:t>
             </a:fld>
             <a:endParaRPr lang="zh-CN" altLang="en-US"/>
           </a:p>
@@ -1067,7 +1067,7 @@
           <a:p>
             <a:fld id="{FC19A4FA-3D9A-4114-B0D5-759CBD56F1AB}" type="datetimeFigureOut">
               <a:rPr lang="zh-CN" altLang="en-US" smtClean="0"/>
-              <a:t>2024/5/17</a:t>
+              <a:t>2024/5/18</a:t>
             </a:fld>
             <a:endParaRPr lang="zh-CN" altLang="en-US"/>
           </a:p>
@@ -1291,7 +1291,7 @@
           <a:p>
             <a:fld id="{FC19A4FA-3D9A-4114-B0D5-759CBD56F1AB}" type="datetimeFigureOut">
               <a:rPr lang="zh-CN" altLang="en-US" smtClean="0"/>
-              <a:t>2024/5/17</a:t>
+              <a:t>2024/5/18</a:t>
             </a:fld>
             <a:endParaRPr lang="zh-CN" altLang="en-US"/>
           </a:p>
@@ -1525,7 +1525,7 @@
           <a:p>
             <a:fld id="{FC19A4FA-3D9A-4114-B0D5-759CBD56F1AB}" type="datetimeFigureOut">
               <a:rPr lang="zh-CN" altLang="en-US" smtClean="0"/>
-              <a:t>2024/5/17</a:t>
+              <a:t>2024/5/18</a:t>
             </a:fld>
             <a:endParaRPr lang="zh-CN" altLang="en-US"/>
           </a:p>
@@ -1924,7 +1924,7 @@
           <a:p>
             <a:fld id="{FC19A4FA-3D9A-4114-B0D5-759CBD56F1AB}" type="datetimeFigureOut">
               <a:rPr lang="zh-CN" altLang="en-US" smtClean="0"/>
-              <a:t>2024/5/17</a:t>
+              <a:t>2024/5/18</a:t>
             </a:fld>
             <a:endParaRPr lang="zh-CN" altLang="en-US"/>
           </a:p>
@@ -2204,7 +2204,7 @@
           <a:p>
             <a:fld id="{FC19A4FA-3D9A-4114-B0D5-759CBD56F1AB}" type="datetimeFigureOut">
               <a:rPr lang="zh-CN" altLang="en-US" smtClean="0"/>
-              <a:t>2024/5/17</a:t>
+              <a:t>2024/5/18</a:t>
             </a:fld>
             <a:endParaRPr lang="zh-CN" altLang="en-US"/>
           </a:p>
@@ -2356,7 +2356,7 @@
           <a:p>
             <a:fld id="{FC19A4FA-3D9A-4114-B0D5-759CBD56F1AB}" type="datetimeFigureOut">
               <a:rPr lang="zh-CN" altLang="en-US" smtClean="0"/>
-              <a:t>2024/5/17</a:t>
+              <a:t>2024/5/18</a:t>
             </a:fld>
             <a:endParaRPr lang="zh-CN" altLang="en-US"/>
           </a:p>
@@ -2486,7 +2486,7 @@
           <a:p>
             <a:fld id="{FC19A4FA-3D9A-4114-B0D5-759CBD56F1AB}" type="datetimeFigureOut">
               <a:rPr lang="zh-CN" altLang="en-US" smtClean="0"/>
-              <a:t>2024/5/17</a:t>
+              <a:t>2024/5/18</a:t>
             </a:fld>
             <a:endParaRPr lang="zh-CN" altLang="en-US"/>
           </a:p>
@@ -2796,7 +2796,7 @@
           <a:p>
             <a:fld id="{FC19A4FA-3D9A-4114-B0D5-759CBD56F1AB}" type="datetimeFigureOut">
               <a:rPr lang="zh-CN" altLang="en-US" smtClean="0"/>
-              <a:t>2024/5/17</a:t>
+              <a:t>2024/5/18</a:t>
             </a:fld>
             <a:endParaRPr lang="zh-CN" altLang="en-US"/>
           </a:p>
@@ -3083,7 +3083,7 @@
           <a:p>
             <a:fld id="{FC19A4FA-3D9A-4114-B0D5-759CBD56F1AB}" type="datetimeFigureOut">
               <a:rPr lang="zh-CN" altLang="en-US" smtClean="0"/>
-              <a:t>2024/5/17</a:t>
+              <a:t>2024/5/18</a:t>
             </a:fld>
             <a:endParaRPr lang="zh-CN" altLang="en-US"/>
           </a:p>
@@ -3376,7 +3376,7 @@
           <a:p>
             <a:fld id="{FC19A4FA-3D9A-4114-B0D5-759CBD56F1AB}" type="datetimeFigureOut">
               <a:rPr lang="zh-CN" altLang="en-US" smtClean="0"/>
-              <a:t>2024/5/17</a:t>
+              <a:t>2024/5/18</a:t>
             </a:fld>
             <a:endParaRPr lang="zh-CN" altLang="en-US"/>
           </a:p>
@@ -6801,8 +6801,8 @@
         </p:nvSpPr>
         <p:spPr>
           <a:xfrm>
-            <a:off x="1139654" y="2512099"/>
-            <a:ext cx="9674564" cy="3693319"/>
+            <a:off x="838200" y="2520191"/>
+            <a:ext cx="8572837" cy="3385542"/>
           </a:xfrm>
           <a:prstGeom prst="rect">
             <a:avLst/>
@@ -6821,7 +6821,7 @@
           <a:lstStyle/>
           <a:p>
             <a:r>
-              <a:rPr lang="en" altLang="zh-CN" b="0" dirty="0">
+              <a:rPr lang="en" altLang="zh-CN" sz="1600" b="0" dirty="0">
                 <a:solidFill>
                   <a:srgbClr val="0000FF"/>
                 </a:solidFill>
@@ -6831,7 +6831,7 @@
               <a:t>__global__</a:t>
             </a:r>
             <a:r>
-              <a:rPr lang="en" altLang="zh-CN" b="0" dirty="0">
+              <a:rPr lang="en" altLang="zh-CN" sz="1600" b="0" dirty="0">
                 <a:solidFill>
                   <a:srgbClr val="000000"/>
                 </a:solidFill>
@@ -6841,7 +6841,7 @@
               <a:t> </a:t>
             </a:r>
             <a:r>
-              <a:rPr lang="en" altLang="zh-CN" b="0" dirty="0">
+              <a:rPr lang="en" altLang="zh-CN" sz="1600" b="0" dirty="0">
                 <a:solidFill>
                   <a:srgbClr val="0000FF"/>
                 </a:solidFill>
@@ -6851,7 +6851,7 @@
               <a:t>void</a:t>
             </a:r>
             <a:r>
-              <a:rPr lang="en" altLang="zh-CN" b="0" dirty="0">
+              <a:rPr lang="en" altLang="zh-CN" sz="1600" b="0" dirty="0">
                 <a:solidFill>
                   <a:srgbClr val="000000"/>
                 </a:solidFill>
@@ -6861,7 +6861,7 @@
               <a:t> </a:t>
             </a:r>
             <a:r>
-              <a:rPr lang="en" altLang="zh-CN" b="0" dirty="0" err="1">
+              <a:rPr lang="en" altLang="zh-CN" sz="1600" b="0" dirty="0" err="1">
                 <a:solidFill>
                   <a:srgbClr val="795E26"/>
                 </a:solidFill>
@@ -6871,7 +6871,7 @@
               <a:t>mykernel</a:t>
             </a:r>
             <a:r>
-              <a:rPr lang="en" altLang="zh-CN" b="0" dirty="0">
+              <a:rPr lang="en" altLang="zh-CN" sz="1600" b="0" dirty="0">
                 <a:solidFill>
                   <a:srgbClr val="000000"/>
                 </a:solidFill>
@@ -6883,7 +6883,7 @@
           </a:p>
           <a:p>
             <a:r>
-              <a:rPr lang="en" altLang="zh-CN" b="0" dirty="0">
+              <a:rPr lang="en" altLang="zh-CN" sz="1600" b="0" dirty="0">
                 <a:solidFill>
                   <a:srgbClr val="000000"/>
                 </a:solidFill>
@@ -6895,7 +6895,7 @@
           </a:p>
           <a:p>
             <a:r>
-              <a:rPr lang="en" altLang="zh-CN" b="0" dirty="0">
+              <a:rPr lang="en" altLang="zh-CN" sz="1600" b="0" dirty="0">
                 <a:solidFill>
                   <a:srgbClr val="795E26"/>
                 </a:solidFill>
@@ -6905,7 +6905,7 @@
               <a:t>    </a:t>
             </a:r>
             <a:r>
-              <a:rPr lang="en" altLang="zh-CN" b="0" dirty="0" err="1">
+              <a:rPr lang="en" altLang="zh-CN" sz="1600" b="0" dirty="0" err="1">
                 <a:solidFill>
                   <a:srgbClr val="795E26"/>
                 </a:solidFill>
@@ -6915,7 +6915,7 @@
               <a:t>printf</a:t>
             </a:r>
             <a:r>
-              <a:rPr lang="en" altLang="zh-CN" b="0" dirty="0">
+              <a:rPr lang="en" altLang="zh-CN" sz="1600" b="0" dirty="0">
                 <a:solidFill>
                   <a:srgbClr val="000000"/>
                 </a:solidFill>
@@ -6925,7 +6925,7 @@
               <a:t>(</a:t>
             </a:r>
             <a:r>
-              <a:rPr lang="en" altLang="zh-CN" b="0" dirty="0">
+              <a:rPr lang="en" altLang="zh-CN" sz="1600" b="0" dirty="0">
                 <a:solidFill>
                   <a:srgbClr val="A31515"/>
                 </a:solidFill>
@@ -6935,7 +6935,7 @@
               <a:t>"Hello, CUDA. I'm Thread </a:t>
             </a:r>
             <a:r>
-              <a:rPr lang="en" altLang="zh-CN" b="0" dirty="0">
+              <a:rPr lang="en" altLang="zh-CN" sz="1600" b="0" dirty="0">
                 <a:solidFill>
                   <a:srgbClr val="001080"/>
                 </a:solidFill>
@@ -6945,7 +6945,7 @@
               <a:t>%d</a:t>
             </a:r>
             <a:r>
-              <a:rPr lang="en" altLang="zh-CN" b="0" dirty="0">
+              <a:rPr lang="en" altLang="zh-CN" sz="1600" b="0" dirty="0">
                 <a:solidFill>
                   <a:srgbClr val="A31515"/>
                 </a:solidFill>
@@ -6955,7 +6955,7 @@
               <a:t> in Block </a:t>
             </a:r>
             <a:r>
-              <a:rPr lang="en" altLang="zh-CN" b="0" dirty="0">
+              <a:rPr lang="en" altLang="zh-CN" sz="1600" b="0" dirty="0">
                 <a:solidFill>
                   <a:srgbClr val="001080"/>
                 </a:solidFill>
@@ -6965,7 +6965,7 @@
               <a:t>%d</a:t>
             </a:r>
             <a:r>
-              <a:rPr lang="en" altLang="zh-CN" b="0" dirty="0">
+              <a:rPr lang="en" altLang="zh-CN" sz="1600" b="0" dirty="0">
                 <a:solidFill>
                   <a:srgbClr val="A31515"/>
                 </a:solidFill>
@@ -6975,7 +6975,7 @@
               <a:t>. </a:t>
             </a:r>
             <a:r>
-              <a:rPr lang="en" altLang="zh-CN" b="0" dirty="0" err="1">
+              <a:rPr lang="en" altLang="zh-CN" sz="1600" b="0" dirty="0" err="1">
                 <a:solidFill>
                   <a:srgbClr val="A31515"/>
                 </a:solidFill>
@@ -6985,7 +6985,7 @@
               <a:t>blockDim</a:t>
             </a:r>
             <a:r>
-              <a:rPr lang="en" altLang="zh-CN" b="0" dirty="0">
+              <a:rPr lang="en" altLang="zh-CN" sz="1600" b="0" dirty="0">
                 <a:solidFill>
                   <a:srgbClr val="A31515"/>
                 </a:solidFill>
@@ -6995,7 +6995,7 @@
               <a:t>=</a:t>
             </a:r>
             <a:r>
-              <a:rPr lang="en" altLang="zh-CN" b="0" dirty="0">
+              <a:rPr lang="en" altLang="zh-CN" sz="1600" b="0" dirty="0">
                 <a:solidFill>
                   <a:srgbClr val="001080"/>
                 </a:solidFill>
@@ -7005,7 +7005,7 @@
               <a:t>%d</a:t>
             </a:r>
             <a:r>
-              <a:rPr lang="en" altLang="zh-CN" b="0" dirty="0">
+              <a:rPr lang="en" altLang="zh-CN" sz="1600" b="0" dirty="0">
                 <a:solidFill>
                   <a:srgbClr val="A31515"/>
                 </a:solidFill>
@@ -7015,7 +7015,7 @@
               <a:t>.</a:t>
             </a:r>
             <a:r>
-              <a:rPr lang="en" altLang="zh-CN" b="0" dirty="0">
+              <a:rPr lang="en" altLang="zh-CN" sz="1600" b="0" dirty="0">
                 <a:solidFill>
                   <a:srgbClr val="EE0000"/>
                 </a:solidFill>
@@ -7025,7 +7025,7 @@
               <a:t>\n</a:t>
             </a:r>
             <a:r>
-              <a:rPr lang="en" altLang="zh-CN" b="0" dirty="0">
+              <a:rPr lang="en" altLang="zh-CN" sz="1600" b="0" dirty="0">
                 <a:solidFill>
                   <a:srgbClr val="A31515"/>
                 </a:solidFill>
@@ -7035,7 +7035,7 @@
               <a:t>"</a:t>
             </a:r>
             <a:r>
-              <a:rPr lang="en" altLang="zh-CN" b="0" dirty="0">
+              <a:rPr lang="en" altLang="zh-CN" sz="1600" b="0" dirty="0">
                 <a:solidFill>
                   <a:srgbClr val="000000"/>
                 </a:solidFill>
@@ -7047,7 +7047,7 @@
           </a:p>
           <a:p>
             <a:r>
-              <a:rPr lang="en" altLang="zh-CN" b="0" dirty="0">
+              <a:rPr lang="en" altLang="zh-CN" sz="1600" b="0" dirty="0">
                 <a:solidFill>
                   <a:srgbClr val="0000FF"/>
                 </a:solidFill>
@@ -7057,7 +7057,7 @@
               <a:t>              </a:t>
             </a:r>
             <a:r>
-              <a:rPr lang="en" altLang="zh-CN" b="0" dirty="0" err="1">
+              <a:rPr lang="en" altLang="zh-CN" sz="1600" b="0" dirty="0" err="1">
                 <a:solidFill>
                   <a:srgbClr val="0000FF"/>
                 </a:solidFill>
@@ -7067,7 +7067,7 @@
               <a:t>threadIdx</a:t>
             </a:r>
             <a:r>
-              <a:rPr lang="en" altLang="zh-CN" b="0" dirty="0" err="1">
+              <a:rPr lang="en" altLang="zh-CN" sz="1600" b="0" dirty="0" err="1">
                 <a:solidFill>
                   <a:srgbClr val="000000"/>
                 </a:solidFill>
@@ -7077,7 +7077,7 @@
               <a:t>.x</a:t>
             </a:r>
             <a:r>
-              <a:rPr lang="en" altLang="zh-CN" b="0" dirty="0">
+              <a:rPr lang="en" altLang="zh-CN" sz="1600" b="0" dirty="0">
                 <a:solidFill>
                   <a:srgbClr val="000000"/>
                 </a:solidFill>
@@ -7087,7 +7087,7 @@
               <a:t>, </a:t>
             </a:r>
             <a:r>
-              <a:rPr lang="en" altLang="zh-CN" b="0" dirty="0" err="1">
+              <a:rPr lang="en" altLang="zh-CN" sz="1600" b="0" dirty="0" err="1">
                 <a:solidFill>
                   <a:srgbClr val="0000FF"/>
                 </a:solidFill>
@@ -7097,7 +7097,7 @@
               <a:t>blockIdx</a:t>
             </a:r>
             <a:r>
-              <a:rPr lang="en" altLang="zh-CN" b="0" dirty="0" err="1">
+              <a:rPr lang="en" altLang="zh-CN" sz="1600" b="0" dirty="0" err="1">
                 <a:solidFill>
                   <a:srgbClr val="000000"/>
                 </a:solidFill>
@@ -7107,7 +7107,7 @@
               <a:t>.x</a:t>
             </a:r>
             <a:r>
-              <a:rPr lang="en" altLang="zh-CN" b="0" dirty="0">
+              <a:rPr lang="en" altLang="zh-CN" sz="1600" b="0" dirty="0">
                 <a:solidFill>
                   <a:srgbClr val="000000"/>
                 </a:solidFill>
@@ -7117,7 +7117,7 @@
               <a:t>, </a:t>
             </a:r>
             <a:r>
-              <a:rPr lang="en" altLang="zh-CN" b="0" dirty="0" err="1">
+              <a:rPr lang="en" altLang="zh-CN" sz="1600" b="0" dirty="0" err="1">
                 <a:solidFill>
                   <a:srgbClr val="0000FF"/>
                 </a:solidFill>
@@ -7127,7 +7127,7 @@
               <a:t>blockDim</a:t>
             </a:r>
             <a:r>
-              <a:rPr lang="en" altLang="zh-CN" b="0" dirty="0" err="1">
+              <a:rPr lang="en" altLang="zh-CN" sz="1600" b="0" dirty="0" err="1">
                 <a:solidFill>
                   <a:srgbClr val="000000"/>
                 </a:solidFill>
@@ -7137,7 +7137,7 @@
               <a:t>.x</a:t>
             </a:r>
             <a:r>
-              <a:rPr lang="en" altLang="zh-CN" b="0" dirty="0">
+              <a:rPr lang="en" altLang="zh-CN" sz="1600" b="0" dirty="0">
                 <a:solidFill>
                   <a:srgbClr val="000000"/>
                 </a:solidFill>
@@ -7149,7 +7149,7 @@
           </a:p>
           <a:p>
             <a:r>
-              <a:rPr lang="en" altLang="zh-CN" b="0" dirty="0">
+              <a:rPr lang="en" altLang="zh-CN" sz="1600" b="0" dirty="0">
                 <a:solidFill>
                   <a:srgbClr val="000000"/>
                 </a:solidFill>
@@ -7161,7 +7161,7 @@
           </a:p>
           <a:p>
             <a:br>
-              <a:rPr lang="en" altLang="zh-CN" b="0" dirty="0">
+              <a:rPr lang="en" altLang="zh-CN" sz="1600" b="0" dirty="0">
                 <a:solidFill>
                   <a:srgbClr val="000000"/>
                 </a:solidFill>
@@ -7170,7 +7170,7 @@
               </a:rPr>
             </a:br>
             <a:r>
-              <a:rPr lang="en" altLang="zh-CN" b="0" dirty="0">
+              <a:rPr lang="en" altLang="zh-CN" sz="1600" b="0" dirty="0">
                 <a:solidFill>
                   <a:srgbClr val="0000FF"/>
                 </a:solidFill>
@@ -7180,7 +7180,7 @@
               <a:t>int</a:t>
             </a:r>
             <a:r>
-              <a:rPr lang="en" altLang="zh-CN" b="0" dirty="0">
+              <a:rPr lang="en" altLang="zh-CN" sz="1600" b="0" dirty="0">
                 <a:solidFill>
                   <a:srgbClr val="000000"/>
                 </a:solidFill>
@@ -7190,7 +7190,7 @@
               <a:t> </a:t>
             </a:r>
             <a:r>
-              <a:rPr lang="en" altLang="zh-CN" b="0" dirty="0">
+              <a:rPr lang="en" altLang="zh-CN" sz="1600" b="0" dirty="0">
                 <a:solidFill>
                   <a:srgbClr val="795E26"/>
                 </a:solidFill>
@@ -7200,7 +7200,7 @@
               <a:t>main</a:t>
             </a:r>
             <a:r>
-              <a:rPr lang="en" altLang="zh-CN" b="0" dirty="0">
+              <a:rPr lang="en" altLang="zh-CN" sz="1600" b="0" dirty="0">
                 <a:solidFill>
                   <a:srgbClr val="000000"/>
                 </a:solidFill>
@@ -7212,7 +7212,7 @@
           </a:p>
           <a:p>
             <a:r>
-              <a:rPr lang="en" altLang="zh-CN" b="0" dirty="0">
+              <a:rPr lang="en" altLang="zh-CN" sz="1600" b="0" dirty="0">
                 <a:solidFill>
                   <a:srgbClr val="000000"/>
                 </a:solidFill>
@@ -7224,7 +7224,7 @@
           </a:p>
           <a:p>
             <a:r>
-              <a:rPr lang="en" altLang="zh-CN" dirty="0">
+              <a:rPr lang="en" altLang="zh-CN" sz="1600" dirty="0">
                 <a:solidFill>
                   <a:srgbClr val="000000"/>
                 </a:solidFill>
@@ -7232,7 +7232,7 @@
               </a:rPr>
               <a:t>    ...</a:t>
             </a:r>
-            <a:endParaRPr lang="en" altLang="zh-CN" b="0" dirty="0">
+            <a:endParaRPr lang="en" altLang="zh-CN" sz="1600" b="0" dirty="0">
               <a:solidFill>
                 <a:srgbClr val="000000"/>
               </a:solidFill>
@@ -7242,7 +7242,7 @@
           </a:p>
           <a:p>
             <a:r>
-              <a:rPr lang="en" altLang="zh-CN" b="0" dirty="0">
+              <a:rPr lang="en" altLang="zh-CN" sz="1600" b="0" dirty="0">
                 <a:solidFill>
                   <a:srgbClr val="000000"/>
                 </a:solidFill>
@@ -7252,7 +7252,7 @@
               <a:t>    </a:t>
             </a:r>
             <a:r>
-              <a:rPr lang="en" altLang="zh-CN" b="0" dirty="0" err="1">
+              <a:rPr lang="en" altLang="zh-CN" sz="1600" b="0" dirty="0" err="1">
                 <a:solidFill>
                   <a:srgbClr val="000000"/>
                 </a:solidFill>
@@ -7262,7 +7262,7 @@
               <a:t>mykernel</a:t>
             </a:r>
             <a:r>
-              <a:rPr lang="en" altLang="zh-CN" b="0" dirty="0">
+              <a:rPr lang="en" altLang="zh-CN" sz="1600" b="0" dirty="0">
                 <a:solidFill>
                   <a:srgbClr val="000000"/>
                 </a:solidFill>
@@ -7272,7 +7272,7 @@
               <a:t>&lt;&lt;&lt;</a:t>
             </a:r>
             <a:r>
-              <a:rPr lang="en" altLang="zh-CN" b="0" dirty="0">
+              <a:rPr lang="en" altLang="zh-CN" sz="1600" b="0" dirty="0">
                 <a:solidFill>
                   <a:srgbClr val="098658"/>
                 </a:solidFill>
@@ -7282,7 +7282,7 @@
               <a:t>2</a:t>
             </a:r>
             <a:r>
-              <a:rPr lang="en" altLang="zh-CN" b="0" dirty="0">
+              <a:rPr lang="en" altLang="zh-CN" sz="1600" b="0" dirty="0">
                 <a:solidFill>
                   <a:srgbClr val="000000"/>
                 </a:solidFill>
@@ -7292,7 +7292,7 @@
               <a:t>,</a:t>
             </a:r>
             <a:r>
-              <a:rPr lang="en" altLang="zh-CN" b="0" dirty="0">
+              <a:rPr lang="en" altLang="zh-CN" sz="1600" b="0" dirty="0">
                 <a:solidFill>
                   <a:srgbClr val="098658"/>
                 </a:solidFill>
@@ -7302,7 +7302,7 @@
               <a:t>2</a:t>
             </a:r>
             <a:r>
-              <a:rPr lang="en" altLang="zh-CN" b="0" dirty="0">
+              <a:rPr lang="en" altLang="zh-CN" sz="1600" b="0" dirty="0">
                 <a:solidFill>
                   <a:srgbClr val="000000"/>
                 </a:solidFill>
@@ -7314,7 +7314,7 @@
           </a:p>
           <a:p>
             <a:r>
-              <a:rPr lang="en" altLang="zh-CN" dirty="0">
+              <a:rPr lang="en" altLang="zh-CN" sz="1600" dirty="0">
                 <a:solidFill>
                   <a:srgbClr val="000000"/>
                 </a:solidFill>
@@ -7325,7 +7325,7 @@
           </a:p>
           <a:p>
             <a:r>
-              <a:rPr lang="en" altLang="zh-CN" b="0" dirty="0">
+              <a:rPr lang="en" altLang="zh-CN" sz="1600" b="0" dirty="0">
                 <a:solidFill>
                   <a:srgbClr val="AF00DB"/>
                 </a:solidFill>
@@ -7335,7 +7335,7 @@
               <a:t>    return</a:t>
             </a:r>
             <a:r>
-              <a:rPr lang="en" altLang="zh-CN" b="0" dirty="0">
+              <a:rPr lang="en" altLang="zh-CN" sz="1600" b="0" dirty="0">
                 <a:solidFill>
                   <a:srgbClr val="000000"/>
                 </a:solidFill>
@@ -7345,7 +7345,7 @@
               <a:t> </a:t>
             </a:r>
             <a:r>
-              <a:rPr lang="en" altLang="zh-CN" b="0" dirty="0">
+              <a:rPr lang="en" altLang="zh-CN" sz="1600" b="0" dirty="0">
                 <a:solidFill>
                   <a:srgbClr val="098658"/>
                 </a:solidFill>
@@ -7355,7 +7355,7 @@
               <a:t>0</a:t>
             </a:r>
             <a:r>
-              <a:rPr lang="en" altLang="zh-CN" b="0" dirty="0">
+              <a:rPr lang="en" altLang="zh-CN" sz="1600" b="0" dirty="0">
                 <a:solidFill>
                   <a:srgbClr val="000000"/>
                 </a:solidFill>
@@ -7367,7 +7367,7 @@
           </a:p>
           <a:p>
             <a:r>
-              <a:rPr lang="en" altLang="zh-CN" b="0" dirty="0">
+              <a:rPr lang="en" altLang="zh-CN" sz="1600" b="0" dirty="0">
                 <a:solidFill>
                   <a:srgbClr val="000000"/>
                 </a:solidFill>
@@ -7393,7 +7393,7 @@
         </p:nvSpPr>
         <p:spPr>
           <a:xfrm>
-            <a:off x="1809127" y="6488668"/>
+            <a:off x="1728207" y="5987177"/>
             <a:ext cx="1858201" cy="369332"/>
           </a:xfrm>
           <a:prstGeom prst="rect">
@@ -7463,6 +7463,88 @@
               <a:ea typeface="宋体" panose="02010600030101010101" pitchFamily="2" charset="-122"/>
               <a:cs typeface="+mn-cs"/>
             </a:endParaRPr>
+          </a:p>
+        </p:txBody>
+      </p:sp>
+      <p:pic>
+        <p:nvPicPr>
+          <p:cNvPr id="1026" name="Picture 2">
+            <a:extLst>
+              <a:ext uri="{FF2B5EF4-FFF2-40B4-BE49-F238E27FC236}">
+                <a16:creationId xmlns:a16="http://schemas.microsoft.com/office/drawing/2014/main" id="{22B11278-B12E-4221-6BE1-9195979350EF}"/>
+              </a:ext>
+            </a:extLst>
+          </p:cNvPr>
+          <p:cNvPicPr>
+            <a:picLocks noChangeAspect="1" noChangeArrowheads="1"/>
+          </p:cNvPicPr>
+          <p:nvPr/>
+        </p:nvPicPr>
+        <p:blipFill>
+          <a:blip r:embed="rId2">
+            <a:extLst>
+              <a:ext uri="{28A0092B-C50C-407E-A947-70E740481C1C}">
+                <a14:useLocalDpi xmlns:a14="http://schemas.microsoft.com/office/drawing/2010/main" val="0"/>
+              </a:ext>
+            </a:extLst>
+          </a:blip>
+          <a:srcRect/>
+          <a:stretch>
+            <a:fillRect/>
+          </a:stretch>
+        </p:blipFill>
+        <p:spPr bwMode="auto">
+          <a:xfrm>
+            <a:off x="6689593" y="4212962"/>
+            <a:ext cx="5442887" cy="2586080"/>
+          </a:xfrm>
+          <a:prstGeom prst="rect">
+            <a:avLst/>
+          </a:prstGeom>
+          <a:noFill/>
+          <a:extLst>
+            <a:ext uri="{909E8E84-426E-40DD-AFC4-6F175D3DCCD1}">
+              <a14:hiddenFill xmlns:a14="http://schemas.microsoft.com/office/drawing/2010/main">
+                <a:solidFill>
+                  <a:srgbClr val="FFFFFF"/>
+                </a:solidFill>
+              </a14:hiddenFill>
+            </a:ext>
+          </a:extLst>
+        </p:spPr>
+      </p:pic>
+      <p:sp>
+        <p:nvSpPr>
+          <p:cNvPr id="6" name="文本框 5">
+            <a:extLst>
+              <a:ext uri="{FF2B5EF4-FFF2-40B4-BE49-F238E27FC236}">
+                <a16:creationId xmlns:a16="http://schemas.microsoft.com/office/drawing/2014/main" id="{9D9C39D2-3364-7AA9-710C-378C1A1821D9}"/>
+              </a:ext>
+            </a:extLst>
+          </p:cNvPr>
+          <p:cNvSpPr txBox="1"/>
+          <p:nvPr/>
+        </p:nvSpPr>
+        <p:spPr>
+          <a:xfrm>
+            <a:off x="1189407" y="6593779"/>
+            <a:ext cx="5300405" cy="307777"/>
+          </a:xfrm>
+          <a:prstGeom prst="rect">
+            <a:avLst/>
+          </a:prstGeom>
+          <a:noFill/>
+        </p:spPr>
+        <p:txBody>
+          <a:bodyPr wrap="square">
+            <a:spAutoFit/>
+          </a:bodyPr>
+          <a:lstStyle/>
+          <a:p>
+            <a:r>
+              <a:rPr lang="zh-CN" altLang="en-US" sz="1400" dirty="0"/>
+              <a:t>https://docs.nvidia.com/cuda/cuda-c-programming-guide/index.html</a:t>
+            </a:r>
           </a:p>
         </p:txBody>
       </p:sp>

</xml_diff>